<commit_message>
Swagger and PPT presentasi
</commit_message>
<xml_diff>
--- a/PPT Presentasi/PPT project todo new.pptx
+++ b/PPT Presentasi/PPT project todo new.pptx
@@ -8543,10 +8543,10 @@
       </p:grpSpPr>
       <p:sp>
         <p:nvSpPr>
-          <p:cNvPr id="84" name="Arc 83">
+          <p:cNvPr id="79" name="Arc 78">
             <a:extLst>
               <a:ext uri="{FF2B5EF4-FFF2-40B4-BE49-F238E27FC236}">
-                <a16:creationId xmlns:a16="http://schemas.microsoft.com/office/drawing/2014/main" id="{404D9769-F4A7-48E9-9449-ABDAED0E6A5D}"/>
+                <a16:creationId xmlns:a16="http://schemas.microsoft.com/office/drawing/2014/main" id="{95B24208-86AC-45CA-9338-A366D2AD9E62}"/>
               </a:ext>
             </a:extLst>
           </p:cNvPr>
@@ -8554,9 +8554,9 @@
           <p:nvPr/>
         </p:nvSpPr>
         <p:spPr>
-          <a:xfrm rot="10800000">
-            <a:off x="5249650" y="708557"/>
-            <a:ext cx="1591017" cy="1770891"/>
+          <a:xfrm rot="10800000" flipH="1">
+            <a:off x="7092992" y="1512803"/>
+            <a:ext cx="3374189" cy="2134477"/>
           </a:xfrm>
           <a:prstGeom prst="arc">
             <a:avLst/>
@@ -8565,148 +8565,13 @@
         </p:spPr>
         <p:style>
           <a:lnRef idx="1">
-            <a:schemeClr val="accent1"/>
+            <a:schemeClr val="accent6"/>
           </a:lnRef>
           <a:fillRef idx="0">
-            <a:schemeClr val="accent1"/>
+            <a:schemeClr val="accent6"/>
           </a:fillRef>
           <a:effectRef idx="0">
-            <a:schemeClr val="accent1"/>
-          </a:effectRef>
-          <a:fontRef idx="minor">
-            <a:schemeClr val="tx1"/>
-          </a:fontRef>
-        </p:style>
-        <p:txBody>
-          <a:bodyPr rtlCol="0" anchor="ctr"/>
-          <a:lstStyle/>
-          <a:p>
-            <a:pPr algn="ctr"/>
-            <a:endParaRPr lang="en-ID"/>
-          </a:p>
-        </p:txBody>
-      </p:sp>
-      <p:sp>
-        <p:nvSpPr>
-          <p:cNvPr id="80" name="Arc 79">
-            <a:extLst>
-              <a:ext uri="{FF2B5EF4-FFF2-40B4-BE49-F238E27FC236}">
-                <a16:creationId xmlns:a16="http://schemas.microsoft.com/office/drawing/2014/main" id="{6585E84A-583B-430B-A4F3-D7CCF805A6B1}"/>
-              </a:ext>
-            </a:extLst>
-          </p:cNvPr>
-          <p:cNvSpPr/>
-          <p:nvPr/>
-        </p:nvSpPr>
-        <p:spPr>
-          <a:xfrm rot="5400000">
-            <a:off x="9639303" y="791031"/>
-            <a:ext cx="1770892" cy="1770891"/>
-          </a:xfrm>
-          <a:prstGeom prst="arc">
-            <a:avLst/>
-          </a:prstGeom>
-          <a:ln w="38100"/>
-        </p:spPr>
-        <p:style>
-          <a:lnRef idx="1">
-            <a:schemeClr val="accent1"/>
-          </a:lnRef>
-          <a:fillRef idx="0">
-            <a:schemeClr val="accent1"/>
-          </a:fillRef>
-          <a:effectRef idx="0">
-            <a:schemeClr val="accent1"/>
-          </a:effectRef>
-          <a:fontRef idx="minor">
-            <a:schemeClr val="tx1"/>
-          </a:fontRef>
-        </p:style>
-        <p:txBody>
-          <a:bodyPr rtlCol="0" anchor="ctr"/>
-          <a:lstStyle/>
-          <a:p>
-            <a:pPr algn="ctr"/>
-            <a:endParaRPr lang="en-ID" dirty="0"/>
-          </a:p>
-        </p:txBody>
-      </p:sp>
-      <p:sp>
-        <p:nvSpPr>
-          <p:cNvPr id="79" name="Arc 78">
-            <a:extLst>
-              <a:ext uri="{FF2B5EF4-FFF2-40B4-BE49-F238E27FC236}">
-                <a16:creationId xmlns:a16="http://schemas.microsoft.com/office/drawing/2014/main" id="{95B24208-86AC-45CA-9338-A366D2AD9E62}"/>
-              </a:ext>
-            </a:extLst>
-          </p:cNvPr>
-          <p:cNvSpPr/>
-          <p:nvPr/>
-        </p:nvSpPr>
-        <p:spPr>
-          <a:xfrm rot="10800000" flipH="1">
-            <a:off x="8948407" y="-227254"/>
-            <a:ext cx="1591017" cy="5938352"/>
-          </a:xfrm>
-          <a:prstGeom prst="arc">
-            <a:avLst/>
-          </a:prstGeom>
-          <a:ln w="38100"/>
-        </p:spPr>
-        <p:style>
-          <a:lnRef idx="1">
-            <a:schemeClr val="accent5"/>
-          </a:lnRef>
-          <a:fillRef idx="0">
-            <a:schemeClr val="accent5"/>
-          </a:fillRef>
-          <a:effectRef idx="0">
-            <a:schemeClr val="accent5"/>
-          </a:effectRef>
-          <a:fontRef idx="minor">
-            <a:schemeClr val="tx1"/>
-          </a:fontRef>
-        </p:style>
-        <p:txBody>
-          <a:bodyPr rtlCol="0" anchor="ctr"/>
-          <a:lstStyle/>
-          <a:p>
-            <a:pPr algn="ctr"/>
-            <a:endParaRPr lang="en-ID"/>
-          </a:p>
-        </p:txBody>
-      </p:sp>
-      <p:sp>
-        <p:nvSpPr>
-          <p:cNvPr id="78" name="Arc 77">
-            <a:extLst>
-              <a:ext uri="{FF2B5EF4-FFF2-40B4-BE49-F238E27FC236}">
-                <a16:creationId xmlns:a16="http://schemas.microsoft.com/office/drawing/2014/main" id="{17A152B5-5699-4F68-A082-468CB7AABD89}"/>
-              </a:ext>
-            </a:extLst>
-          </p:cNvPr>
-          <p:cNvSpPr/>
-          <p:nvPr/>
-        </p:nvSpPr>
-        <p:spPr>
-          <a:xfrm rot="10800000">
-            <a:off x="8804731" y="2040235"/>
-            <a:ext cx="1591017" cy="3681286"/>
-          </a:xfrm>
-          <a:prstGeom prst="arc">
-            <a:avLst/>
-          </a:prstGeom>
-          <a:ln w="38100"/>
-        </p:spPr>
-        <p:style>
-          <a:lnRef idx="1">
-            <a:schemeClr val="accent5"/>
-          </a:lnRef>
-          <a:fillRef idx="0">
-            <a:schemeClr val="accent5"/>
-          </a:fillRef>
-          <a:effectRef idx="0">
-            <a:schemeClr val="accent5"/>
+            <a:schemeClr val="accent6"/>
           </a:effectRef>
           <a:fontRef idx="minor">
             <a:schemeClr val="tx1"/>
@@ -8964,60 +8829,6 @@
               <a:t>Git Workflow</a:t>
             </a:r>
             <a:endParaRPr lang="en-ID" dirty="0"/>
-          </a:p>
-        </p:txBody>
-      </p:sp>
-      <p:sp>
-        <p:nvSpPr>
-          <p:cNvPr id="19" name="Rectangle 18">
-            <a:extLst>
-              <a:ext uri="{FF2B5EF4-FFF2-40B4-BE49-F238E27FC236}">
-                <a16:creationId xmlns:a16="http://schemas.microsoft.com/office/drawing/2014/main" id="{10E97E52-22EA-4B57-A2C9-7422C33C026C}"/>
-              </a:ext>
-            </a:extLst>
-          </p:cNvPr>
-          <p:cNvSpPr/>
-          <p:nvPr/>
-        </p:nvSpPr>
-        <p:spPr>
-          <a:xfrm>
-            <a:off x="1529881" y="1237021"/>
-            <a:ext cx="1691491" cy="395024"/>
-          </a:xfrm>
-          <a:prstGeom prst="rect">
-            <a:avLst/>
-          </a:prstGeom>
-        </p:spPr>
-        <p:style>
-          <a:lnRef idx="2">
-            <a:schemeClr val="dk1">
-              <a:shade val="50000"/>
-            </a:schemeClr>
-          </a:lnRef>
-          <a:fillRef idx="1">
-            <a:schemeClr val="dk1"/>
-          </a:fillRef>
-          <a:effectRef idx="0">
-            <a:schemeClr val="dk1"/>
-          </a:effectRef>
-          <a:fontRef idx="minor">
-            <a:schemeClr val="lt1"/>
-          </a:fontRef>
-        </p:style>
-        <p:txBody>
-          <a:bodyPr rtlCol="0" anchor="ctr"/>
-          <a:lstStyle/>
-          <a:p>
-            <a:pPr algn="ctr"/>
-            <a:r>
-              <a:rPr lang="en-US" dirty="0">
-                <a:latin typeface="+mj-lt"/>
-              </a:rPr>
-              <a:t>Release</a:t>
-            </a:r>
-            <a:endParaRPr lang="en-ID" dirty="0">
-              <a:latin typeface="+mj-lt"/>
-            </a:endParaRPr>
           </a:p>
         </p:txBody>
       </p:sp>
@@ -9184,66 +8995,6 @@
               <a:t>Feature</a:t>
             </a:r>
             <a:endParaRPr lang="en-ID" dirty="0">
-              <a:latin typeface="+mj-lt"/>
-            </a:endParaRPr>
-          </a:p>
-        </p:txBody>
-      </p:sp>
-      <p:sp>
-        <p:nvSpPr>
-          <p:cNvPr id="23" name="Rectangle 22">
-            <a:extLst>
-              <a:ext uri="{FF2B5EF4-FFF2-40B4-BE49-F238E27FC236}">
-                <a16:creationId xmlns:a16="http://schemas.microsoft.com/office/drawing/2014/main" id="{75E6333D-C562-4D0A-AE9E-FB8B17E89EA1}"/>
-              </a:ext>
-            </a:extLst>
-          </p:cNvPr>
-          <p:cNvSpPr/>
-          <p:nvPr/>
-        </p:nvSpPr>
-        <p:spPr>
-          <a:xfrm>
-            <a:off x="1545922" y="5518485"/>
-            <a:ext cx="1691491" cy="395024"/>
-          </a:xfrm>
-          <a:prstGeom prst="rect">
-            <a:avLst/>
-          </a:prstGeom>
-        </p:spPr>
-        <p:style>
-          <a:lnRef idx="2">
-            <a:schemeClr val="accent5">
-              <a:shade val="50000"/>
-            </a:schemeClr>
-          </a:lnRef>
-          <a:fillRef idx="1">
-            <a:schemeClr val="accent5"/>
-          </a:fillRef>
-          <a:effectRef idx="0">
-            <a:schemeClr val="accent5"/>
-          </a:effectRef>
-          <a:fontRef idx="minor">
-            <a:schemeClr val="lt1"/>
-          </a:fontRef>
-        </p:style>
-        <p:txBody>
-          <a:bodyPr rtlCol="0" anchor="ctr"/>
-          <a:lstStyle/>
-          <a:p>
-            <a:pPr algn="ctr"/>
-            <a:r>
-              <a:rPr lang="en-US" dirty="0">
-                <a:solidFill>
-                  <a:schemeClr val="tx1"/>
-                </a:solidFill>
-                <a:latin typeface="+mj-lt"/>
-              </a:rPr>
-              <a:t>Testing</a:t>
-            </a:r>
-            <a:endParaRPr lang="en-ID" dirty="0">
-              <a:solidFill>
-                <a:schemeClr val="tx1"/>
-              </a:solidFill>
               <a:latin typeface="+mj-lt"/>
             </a:endParaRPr>
           </a:p>
@@ -9728,163 +9479,6 @@
       </p:grpSp>
       <p:grpSp>
         <p:nvGrpSpPr>
-          <p:cNvPr id="48" name="Group 47">
-            <a:extLst>
-              <a:ext uri="{FF2B5EF4-FFF2-40B4-BE49-F238E27FC236}">
-                <a16:creationId xmlns:a16="http://schemas.microsoft.com/office/drawing/2014/main" id="{FABAF979-999D-46AF-8EE4-53CE7C78BB42}"/>
-              </a:ext>
-            </a:extLst>
-          </p:cNvPr>
-          <p:cNvGrpSpPr/>
-          <p:nvPr/>
-        </p:nvGrpSpPr>
-        <p:grpSpPr>
-          <a:xfrm>
-            <a:off x="9356180" y="5454386"/>
-            <a:ext cx="540000" cy="540000"/>
-            <a:chOff x="7182318" y="2291024"/>
-            <a:chExt cx="540000" cy="540000"/>
-          </a:xfrm>
-        </p:grpSpPr>
-        <p:sp>
-          <p:nvSpPr>
-            <p:cNvPr id="49" name="Oval 48">
-              <a:extLst>
-                <a:ext uri="{FF2B5EF4-FFF2-40B4-BE49-F238E27FC236}">
-                  <a16:creationId xmlns:a16="http://schemas.microsoft.com/office/drawing/2014/main" id="{8B2918FC-0976-4AED-AB1C-1DC2CDED2C07}"/>
-                </a:ext>
-              </a:extLst>
-            </p:cNvPr>
-            <p:cNvSpPr/>
-            <p:nvPr/>
-          </p:nvSpPr>
-          <p:spPr>
-            <a:xfrm>
-              <a:off x="7182318" y="2291024"/>
-              <a:ext cx="540000" cy="540000"/>
-            </a:xfrm>
-            <a:prstGeom prst="ellipse">
-              <a:avLst/>
-            </a:prstGeom>
-            <a:ln/>
-          </p:spPr>
-          <p:style>
-            <a:lnRef idx="2">
-              <a:schemeClr val="dk1"/>
-            </a:lnRef>
-            <a:fillRef idx="1">
-              <a:schemeClr val="lt1"/>
-            </a:fillRef>
-            <a:effectRef idx="0">
-              <a:schemeClr val="dk1"/>
-            </a:effectRef>
-            <a:fontRef idx="minor">
-              <a:schemeClr val="dk1"/>
-            </a:fontRef>
-          </p:style>
-          <p:txBody>
-            <a:bodyPr rtlCol="0" anchor="ctr"/>
-            <a:lstStyle/>
-            <a:p>
-              <a:pPr algn="ctr"/>
-              <a:endParaRPr lang="en-ID"/>
-            </a:p>
-          </p:txBody>
-        </p:sp>
-        <p:sp>
-          <p:nvSpPr>
-            <p:cNvPr id="50" name="Oval 49">
-              <a:extLst>
-                <a:ext uri="{FF2B5EF4-FFF2-40B4-BE49-F238E27FC236}">
-                  <a16:creationId xmlns:a16="http://schemas.microsoft.com/office/drawing/2014/main" id="{CFBC3936-A2A5-46BB-B94E-68B81B5F0A84}"/>
-                </a:ext>
-              </a:extLst>
-            </p:cNvPr>
-            <p:cNvSpPr/>
-            <p:nvPr/>
-          </p:nvSpPr>
-          <p:spPr>
-            <a:xfrm>
-              <a:off x="7272318" y="2378159"/>
-              <a:ext cx="360000" cy="360000"/>
-            </a:xfrm>
-            <a:prstGeom prst="ellipse">
-              <a:avLst/>
-            </a:prstGeom>
-            <a:solidFill>
-              <a:srgbClr val="FFC000"/>
-            </a:solidFill>
-            <a:ln>
-              <a:solidFill>
-                <a:schemeClr val="tx1"/>
-              </a:solidFill>
-            </a:ln>
-          </p:spPr>
-          <p:style>
-            <a:lnRef idx="2">
-              <a:schemeClr val="accent1">
-                <a:shade val="50000"/>
-              </a:schemeClr>
-            </a:lnRef>
-            <a:fillRef idx="1">
-              <a:schemeClr val="accent1"/>
-            </a:fillRef>
-            <a:effectRef idx="0">
-              <a:schemeClr val="accent1"/>
-            </a:effectRef>
-            <a:fontRef idx="minor">
-              <a:schemeClr val="lt1"/>
-            </a:fontRef>
-          </p:style>
-          <p:txBody>
-            <a:bodyPr rtlCol="0" anchor="ctr"/>
-            <a:lstStyle/>
-            <a:p>
-              <a:pPr algn="ctr"/>
-              <a:endParaRPr lang="en-ID" dirty="0"/>
-            </a:p>
-          </p:txBody>
-        </p:sp>
-      </p:grpSp>
-      <p:cxnSp>
-        <p:nvCxnSpPr>
-          <p:cNvPr id="85" name="Straight Connector 84">
-            <a:extLst>
-              <a:ext uri="{FF2B5EF4-FFF2-40B4-BE49-F238E27FC236}">
-                <a16:creationId xmlns:a16="http://schemas.microsoft.com/office/drawing/2014/main" id="{D35254C8-FD4F-484A-866A-7010ED6B3BC8}"/>
-              </a:ext>
-            </a:extLst>
-          </p:cNvPr>
-          <p:cNvCxnSpPr/>
-          <p:nvPr/>
-        </p:nvCxnSpPr>
-        <p:spPr>
-          <a:xfrm>
-            <a:off x="5411763" y="1442922"/>
-            <a:ext cx="5868000" cy="0"/>
-          </a:xfrm>
-          <a:prstGeom prst="line">
-            <a:avLst/>
-          </a:prstGeom>
-          <a:ln w="38100"/>
-        </p:spPr>
-        <p:style>
-          <a:lnRef idx="1">
-            <a:schemeClr val="dk1"/>
-          </a:lnRef>
-          <a:fillRef idx="0">
-            <a:schemeClr val="dk1"/>
-          </a:fillRef>
-          <a:effectRef idx="0">
-            <a:schemeClr val="dk1"/>
-          </a:effectRef>
-          <a:fontRef idx="minor">
-            <a:schemeClr val="tx1"/>
-          </a:fontRef>
-        </p:style>
-      </p:cxnSp>
-      <p:grpSp>
-        <p:nvGrpSpPr>
           <p:cNvPr id="54" name="Group 53">
             <a:extLst>
               <a:ext uri="{FF2B5EF4-FFF2-40B4-BE49-F238E27FC236}">
@@ -9968,246 +9562,6 @@
             <a:prstGeom prst="ellipse">
               <a:avLst/>
             </a:prstGeom>
-            <a:ln>
-              <a:solidFill>
-                <a:schemeClr val="tx1"/>
-              </a:solidFill>
-            </a:ln>
-          </p:spPr>
-          <p:style>
-            <a:lnRef idx="2">
-              <a:schemeClr val="accent1">
-                <a:shade val="50000"/>
-              </a:schemeClr>
-            </a:lnRef>
-            <a:fillRef idx="1">
-              <a:schemeClr val="accent1"/>
-            </a:fillRef>
-            <a:effectRef idx="0">
-              <a:schemeClr val="accent1"/>
-            </a:effectRef>
-            <a:fontRef idx="minor">
-              <a:schemeClr val="lt1"/>
-            </a:fontRef>
-          </p:style>
-          <p:txBody>
-            <a:bodyPr rtlCol="0" anchor="ctr"/>
-            <a:lstStyle/>
-            <a:p>
-              <a:pPr algn="ctr"/>
-              <a:endParaRPr lang="en-ID" dirty="0"/>
-            </a:p>
-          </p:txBody>
-        </p:sp>
-      </p:grpSp>
-      <p:grpSp>
-        <p:nvGrpSpPr>
-          <p:cNvPr id="66" name="Group 65">
-            <a:extLst>
-              <a:ext uri="{FF2B5EF4-FFF2-40B4-BE49-F238E27FC236}">
-                <a16:creationId xmlns:a16="http://schemas.microsoft.com/office/drawing/2014/main" id="{B67E736E-9663-4DE6-A41F-30BDDB4645B2}"/>
-              </a:ext>
-            </a:extLst>
-          </p:cNvPr>
-          <p:cNvGrpSpPr/>
-          <p:nvPr/>
-        </p:nvGrpSpPr>
-        <p:grpSpPr>
-          <a:xfrm>
-            <a:off x="11115342" y="1172922"/>
-            <a:ext cx="540000" cy="540000"/>
-            <a:chOff x="7182318" y="2291024"/>
-            <a:chExt cx="540000" cy="540000"/>
-          </a:xfrm>
-        </p:grpSpPr>
-        <p:sp>
-          <p:nvSpPr>
-            <p:cNvPr id="67" name="Oval 66">
-              <a:extLst>
-                <a:ext uri="{FF2B5EF4-FFF2-40B4-BE49-F238E27FC236}">
-                  <a16:creationId xmlns:a16="http://schemas.microsoft.com/office/drawing/2014/main" id="{7ED81D72-F99D-4939-BB74-820F0000B2B3}"/>
-                </a:ext>
-              </a:extLst>
-            </p:cNvPr>
-            <p:cNvSpPr/>
-            <p:nvPr/>
-          </p:nvSpPr>
-          <p:spPr>
-            <a:xfrm>
-              <a:off x="7182318" y="2291024"/>
-              <a:ext cx="540000" cy="540000"/>
-            </a:xfrm>
-            <a:prstGeom prst="ellipse">
-              <a:avLst/>
-            </a:prstGeom>
-            <a:ln/>
-          </p:spPr>
-          <p:style>
-            <a:lnRef idx="2">
-              <a:schemeClr val="dk1"/>
-            </a:lnRef>
-            <a:fillRef idx="1">
-              <a:schemeClr val="lt1"/>
-            </a:fillRef>
-            <a:effectRef idx="0">
-              <a:schemeClr val="dk1"/>
-            </a:effectRef>
-            <a:fontRef idx="minor">
-              <a:schemeClr val="dk1"/>
-            </a:fontRef>
-          </p:style>
-          <p:txBody>
-            <a:bodyPr rtlCol="0" anchor="ctr"/>
-            <a:lstStyle/>
-            <a:p>
-              <a:pPr algn="ctr"/>
-              <a:endParaRPr lang="en-ID"/>
-            </a:p>
-          </p:txBody>
-        </p:sp>
-        <p:sp>
-          <p:nvSpPr>
-            <p:cNvPr id="68" name="Oval 67">
-              <a:extLst>
-                <a:ext uri="{FF2B5EF4-FFF2-40B4-BE49-F238E27FC236}">
-                  <a16:creationId xmlns:a16="http://schemas.microsoft.com/office/drawing/2014/main" id="{1C995F93-6963-4B6E-8DBD-B4C115CBC5A0}"/>
-                </a:ext>
-              </a:extLst>
-            </p:cNvPr>
-            <p:cNvSpPr/>
-            <p:nvPr/>
-          </p:nvSpPr>
-          <p:spPr>
-            <a:xfrm>
-              <a:off x="7272318" y="2378159"/>
-              <a:ext cx="360000" cy="360000"/>
-            </a:xfrm>
-            <a:prstGeom prst="ellipse">
-              <a:avLst/>
-            </a:prstGeom>
-            <a:solidFill>
-              <a:schemeClr val="tx1"/>
-            </a:solidFill>
-            <a:ln>
-              <a:solidFill>
-                <a:schemeClr val="tx1"/>
-              </a:solidFill>
-            </a:ln>
-          </p:spPr>
-          <p:style>
-            <a:lnRef idx="2">
-              <a:schemeClr val="accent1">
-                <a:shade val="50000"/>
-              </a:schemeClr>
-            </a:lnRef>
-            <a:fillRef idx="1">
-              <a:schemeClr val="accent1"/>
-            </a:fillRef>
-            <a:effectRef idx="0">
-              <a:schemeClr val="accent1"/>
-            </a:effectRef>
-            <a:fontRef idx="minor">
-              <a:schemeClr val="lt1"/>
-            </a:fontRef>
-          </p:style>
-          <p:txBody>
-            <a:bodyPr rtlCol="0" anchor="ctr"/>
-            <a:lstStyle/>
-            <a:p>
-              <a:pPr algn="ctr"/>
-              <a:endParaRPr lang="en-ID" dirty="0"/>
-            </a:p>
-          </p:txBody>
-        </p:sp>
-      </p:grpSp>
-      <p:grpSp>
-        <p:nvGrpSpPr>
-          <p:cNvPr id="81" name="Group 80">
-            <a:extLst>
-              <a:ext uri="{FF2B5EF4-FFF2-40B4-BE49-F238E27FC236}">
-                <a16:creationId xmlns:a16="http://schemas.microsoft.com/office/drawing/2014/main" id="{0A6BC8D1-B0DE-43D4-B2EE-EC9C88F23FB9}"/>
-              </a:ext>
-            </a:extLst>
-          </p:cNvPr>
-          <p:cNvGrpSpPr/>
-          <p:nvPr/>
-        </p:nvGrpSpPr>
-        <p:grpSpPr>
-          <a:xfrm>
-            <a:off x="4961763" y="1139382"/>
-            <a:ext cx="540000" cy="540000"/>
-            <a:chOff x="7182318" y="2291024"/>
-            <a:chExt cx="540000" cy="540000"/>
-          </a:xfrm>
-        </p:grpSpPr>
-        <p:sp>
-          <p:nvSpPr>
-            <p:cNvPr id="82" name="Oval 81">
-              <a:extLst>
-                <a:ext uri="{FF2B5EF4-FFF2-40B4-BE49-F238E27FC236}">
-                  <a16:creationId xmlns:a16="http://schemas.microsoft.com/office/drawing/2014/main" id="{605FEDAD-5D1D-44C4-9865-FBF984E53084}"/>
-                </a:ext>
-              </a:extLst>
-            </p:cNvPr>
-            <p:cNvSpPr/>
-            <p:nvPr/>
-          </p:nvSpPr>
-          <p:spPr>
-            <a:xfrm>
-              <a:off x="7182318" y="2291024"/>
-              <a:ext cx="540000" cy="540000"/>
-            </a:xfrm>
-            <a:prstGeom prst="ellipse">
-              <a:avLst/>
-            </a:prstGeom>
-            <a:ln/>
-          </p:spPr>
-          <p:style>
-            <a:lnRef idx="2">
-              <a:schemeClr val="dk1"/>
-            </a:lnRef>
-            <a:fillRef idx="1">
-              <a:schemeClr val="lt1"/>
-            </a:fillRef>
-            <a:effectRef idx="0">
-              <a:schemeClr val="dk1"/>
-            </a:effectRef>
-            <a:fontRef idx="minor">
-              <a:schemeClr val="dk1"/>
-            </a:fontRef>
-          </p:style>
-          <p:txBody>
-            <a:bodyPr rtlCol="0" anchor="ctr"/>
-            <a:lstStyle/>
-            <a:p>
-              <a:pPr algn="ctr"/>
-              <a:endParaRPr lang="en-ID"/>
-            </a:p>
-          </p:txBody>
-        </p:sp>
-        <p:sp>
-          <p:nvSpPr>
-            <p:cNvPr id="83" name="Oval 82">
-              <a:extLst>
-                <a:ext uri="{FF2B5EF4-FFF2-40B4-BE49-F238E27FC236}">
-                  <a16:creationId xmlns:a16="http://schemas.microsoft.com/office/drawing/2014/main" id="{5F24987C-CEFC-4035-BEC3-C2DA977425A5}"/>
-                </a:ext>
-              </a:extLst>
-            </p:cNvPr>
-            <p:cNvSpPr/>
-            <p:nvPr/>
-          </p:nvSpPr>
-          <p:spPr>
-            <a:xfrm>
-              <a:off x="7272318" y="2378159"/>
-              <a:ext cx="360000" cy="360000"/>
-            </a:xfrm>
-            <a:prstGeom prst="ellipse">
-              <a:avLst/>
-            </a:prstGeom>
-            <a:solidFill>
-              <a:schemeClr val="tx1"/>
-            </a:solidFill>
             <a:ln>
               <a:solidFill>
                 <a:schemeClr val="tx1"/>

</xml_diff>